<commit_message>
Changed title and added visuals
</commit_message>
<xml_diff>
--- a/Effect of Synthetic Opioid Prescriptions on Death Rate.pptx
+++ b/Effect of Synthetic Opioid Prescriptions on Death Rate.pptx
@@ -221,7 +221,7 @@
           <a:p>
             <a:fld id="{58618CF8-27BE-414E-8FDC-5D638C1660AA}" type="datetimeFigureOut">
               <a:rPr lang="en-US" smtClean="0"/>
-              <a:t>8/12/2020</a:t>
+              <a:t>8/13/2020</a:t>
             </a:fld>
             <a:endParaRPr lang="en-US"/>
           </a:p>
@@ -1020,7 +1020,7 @@
           <a:p>
             <a:fld id="{2453AC89-62DB-41BD-A348-232B17B98E60}" type="datetimeFigureOut">
               <a:rPr lang="en-US" smtClean="0"/>
-              <a:t>8/12/2020</a:t>
+              <a:t>8/13/2020</a:t>
             </a:fld>
             <a:endParaRPr lang="en-US"/>
           </a:p>
@@ -1218,7 +1218,7 @@
           <a:p>
             <a:fld id="{2453AC89-62DB-41BD-A348-232B17B98E60}" type="datetimeFigureOut">
               <a:rPr lang="en-US" smtClean="0"/>
-              <a:t>8/12/2020</a:t>
+              <a:t>8/13/2020</a:t>
             </a:fld>
             <a:endParaRPr lang="en-US"/>
           </a:p>
@@ -1426,7 +1426,7 @@
           <a:p>
             <a:fld id="{2453AC89-62DB-41BD-A348-232B17B98E60}" type="datetimeFigureOut">
               <a:rPr lang="en-US" smtClean="0"/>
-              <a:t>8/12/2020</a:t>
+              <a:t>8/13/2020</a:t>
             </a:fld>
             <a:endParaRPr lang="en-US"/>
           </a:p>
@@ -1624,7 +1624,7 @@
           <a:p>
             <a:fld id="{2453AC89-62DB-41BD-A348-232B17B98E60}" type="datetimeFigureOut">
               <a:rPr lang="en-US" smtClean="0"/>
-              <a:t>8/12/2020</a:t>
+              <a:t>8/13/2020</a:t>
             </a:fld>
             <a:endParaRPr lang="en-US"/>
           </a:p>
@@ -1899,7 +1899,7 @@
           <a:p>
             <a:fld id="{2453AC89-62DB-41BD-A348-232B17B98E60}" type="datetimeFigureOut">
               <a:rPr lang="en-US" smtClean="0"/>
-              <a:t>8/12/2020</a:t>
+              <a:t>8/13/2020</a:t>
             </a:fld>
             <a:endParaRPr lang="en-US"/>
           </a:p>
@@ -2164,7 +2164,7 @@
           <a:p>
             <a:fld id="{2453AC89-62DB-41BD-A348-232B17B98E60}" type="datetimeFigureOut">
               <a:rPr lang="en-US" smtClean="0"/>
-              <a:t>8/12/2020</a:t>
+              <a:t>8/13/2020</a:t>
             </a:fld>
             <a:endParaRPr lang="en-US"/>
           </a:p>
@@ -2576,7 +2576,7 @@
           <a:p>
             <a:fld id="{2453AC89-62DB-41BD-A348-232B17B98E60}" type="datetimeFigureOut">
               <a:rPr lang="en-US" smtClean="0"/>
-              <a:t>8/12/2020</a:t>
+              <a:t>8/13/2020</a:t>
             </a:fld>
             <a:endParaRPr lang="en-US"/>
           </a:p>
@@ -2717,7 +2717,7 @@
           <a:p>
             <a:fld id="{2453AC89-62DB-41BD-A348-232B17B98E60}" type="datetimeFigureOut">
               <a:rPr lang="en-US" smtClean="0"/>
-              <a:t>8/12/2020</a:t>
+              <a:t>8/13/2020</a:t>
             </a:fld>
             <a:endParaRPr lang="en-US"/>
           </a:p>
@@ -2830,7 +2830,7 @@
           <a:p>
             <a:fld id="{2453AC89-62DB-41BD-A348-232B17B98E60}" type="datetimeFigureOut">
               <a:rPr lang="en-US" smtClean="0"/>
-              <a:t>8/12/2020</a:t>
+              <a:t>8/13/2020</a:t>
             </a:fld>
             <a:endParaRPr lang="en-US"/>
           </a:p>
@@ -3141,7 +3141,7 @@
           <a:p>
             <a:fld id="{2453AC89-62DB-41BD-A348-232B17B98E60}" type="datetimeFigureOut">
               <a:rPr lang="en-US" smtClean="0"/>
-              <a:t>8/12/2020</a:t>
+              <a:t>8/13/2020</a:t>
             </a:fld>
             <a:endParaRPr lang="en-US"/>
           </a:p>
@@ -3429,7 +3429,7 @@
           <a:p>
             <a:fld id="{2453AC89-62DB-41BD-A348-232B17B98E60}" type="datetimeFigureOut">
               <a:rPr lang="en-US" smtClean="0"/>
-              <a:t>8/12/2020</a:t>
+              <a:t>8/13/2020</a:t>
             </a:fld>
             <a:endParaRPr lang="en-US"/>
           </a:p>
@@ -3670,7 +3670,7 @@
           <a:p>
             <a:fld id="{2453AC89-62DB-41BD-A348-232B17B98E60}" type="datetimeFigureOut">
               <a:rPr lang="en-US" smtClean="0"/>
-              <a:t>8/12/2020</a:t>
+              <a:t>8/13/2020</a:t>
             </a:fld>
             <a:endParaRPr lang="en-US"/>
           </a:p>
@@ -4112,7 +4112,15 @@
           <a:p>
             <a:r>
               <a:rPr lang="en-US" dirty="0"/>
-              <a:t>Synthetic Opioids May Not Be as Deadly as Previously Thought </a:t>
+              <a:t>Synthetic Opioids </a:t>
+            </a:r>
+            <a:r>
+              <a:rPr lang="en-US"/>
+              <a:t>Are Not Deadlier </a:t>
+            </a:r>
+            <a:r>
+              <a:rPr lang="en-US" dirty="0"/>
+              <a:t>Than Natural Opioids</a:t>
             </a:r>
           </a:p>
         </p:txBody>
@@ -5374,6 +5382,272 @@
   <p:clrMapOvr>
     <a:masterClrMapping/>
   </p:clrMapOvr>
+  <p:timing>
+    <p:tnLst>
+      <p:par>
+        <p:cTn id="1" dur="indefinite" restart="never" nodeType="tmRoot">
+          <p:childTnLst>
+            <p:seq concurrent="1" nextAc="seek">
+              <p:cTn id="2" dur="indefinite" nodeType="mainSeq">
+                <p:childTnLst>
+                  <p:par>
+                    <p:cTn id="3" fill="hold">
+                      <p:stCondLst>
+                        <p:cond delay="indefinite"/>
+                      </p:stCondLst>
+                      <p:childTnLst>
+                        <p:par>
+                          <p:cTn id="4" fill="hold">
+                            <p:stCondLst>
+                              <p:cond delay="0"/>
+                            </p:stCondLst>
+                            <p:childTnLst>
+                              <p:par>
+                                <p:cTn id="5" presetID="10" presetClass="entr" presetSubtype="0" fill="hold" nodeType="clickEffect">
+                                  <p:stCondLst>
+                                    <p:cond delay="0"/>
+                                  </p:stCondLst>
+                                  <p:childTnLst>
+                                    <p:set>
+                                      <p:cBhvr>
+                                        <p:cTn id="6" dur="1" fill="hold">
+                                          <p:stCondLst>
+                                            <p:cond delay="0"/>
+                                          </p:stCondLst>
+                                        </p:cTn>
+                                        <p:tgtEl>
+                                          <p:spTgt spid="3">
+                                            <p:txEl>
+                                              <p:pRg st="0" end="0"/>
+                                            </p:txEl>
+                                          </p:spTgt>
+                                        </p:tgtEl>
+                                        <p:attrNameLst>
+                                          <p:attrName>style.visibility</p:attrName>
+                                        </p:attrNameLst>
+                                      </p:cBhvr>
+                                      <p:to>
+                                        <p:strVal val="visible"/>
+                                      </p:to>
+                                    </p:set>
+                                    <p:animEffect transition="in" filter="fade">
+                                      <p:cBhvr>
+                                        <p:cTn id="7" dur="500"/>
+                                        <p:tgtEl>
+                                          <p:spTgt spid="3">
+                                            <p:txEl>
+                                              <p:pRg st="0" end="0"/>
+                                            </p:txEl>
+                                          </p:spTgt>
+                                        </p:tgtEl>
+                                      </p:cBhvr>
+                                    </p:animEffect>
+                                  </p:childTnLst>
+                                </p:cTn>
+                              </p:par>
+                            </p:childTnLst>
+                          </p:cTn>
+                        </p:par>
+                      </p:childTnLst>
+                    </p:cTn>
+                  </p:par>
+                  <p:par>
+                    <p:cTn id="8" fill="hold">
+                      <p:stCondLst>
+                        <p:cond delay="indefinite"/>
+                      </p:stCondLst>
+                      <p:childTnLst>
+                        <p:par>
+                          <p:cTn id="9" fill="hold">
+                            <p:stCondLst>
+                              <p:cond delay="0"/>
+                            </p:stCondLst>
+                            <p:childTnLst>
+                              <p:par>
+                                <p:cTn id="10" presetID="10" presetClass="entr" presetSubtype="0" fill="hold" nodeType="clickEffect">
+                                  <p:stCondLst>
+                                    <p:cond delay="0"/>
+                                  </p:stCondLst>
+                                  <p:childTnLst>
+                                    <p:set>
+                                      <p:cBhvr>
+                                        <p:cTn id="11" dur="1" fill="hold">
+                                          <p:stCondLst>
+                                            <p:cond delay="0"/>
+                                          </p:stCondLst>
+                                        </p:cTn>
+                                        <p:tgtEl>
+                                          <p:spTgt spid="2052"/>
+                                        </p:tgtEl>
+                                        <p:attrNameLst>
+                                          <p:attrName>style.visibility</p:attrName>
+                                        </p:attrNameLst>
+                                      </p:cBhvr>
+                                      <p:to>
+                                        <p:strVal val="visible"/>
+                                      </p:to>
+                                    </p:set>
+                                    <p:animEffect transition="in" filter="fade">
+                                      <p:cBhvr>
+                                        <p:cTn id="12" dur="500"/>
+                                        <p:tgtEl>
+                                          <p:spTgt spid="2052"/>
+                                        </p:tgtEl>
+                                      </p:cBhvr>
+                                    </p:animEffect>
+                                  </p:childTnLst>
+                                </p:cTn>
+                              </p:par>
+                            </p:childTnLst>
+                          </p:cTn>
+                        </p:par>
+                      </p:childTnLst>
+                    </p:cTn>
+                  </p:par>
+                  <p:par>
+                    <p:cTn id="13" fill="hold">
+                      <p:stCondLst>
+                        <p:cond delay="indefinite"/>
+                      </p:stCondLst>
+                      <p:childTnLst>
+                        <p:par>
+                          <p:cTn id="14" fill="hold">
+                            <p:stCondLst>
+                              <p:cond delay="0"/>
+                            </p:stCondLst>
+                            <p:childTnLst>
+                              <p:par>
+                                <p:cTn id="15" presetID="10" presetClass="entr" presetSubtype="0" fill="hold" nodeType="clickEffect">
+                                  <p:stCondLst>
+                                    <p:cond delay="0"/>
+                                  </p:stCondLst>
+                                  <p:childTnLst>
+                                    <p:set>
+                                      <p:cBhvr>
+                                        <p:cTn id="16" dur="1" fill="hold">
+                                          <p:stCondLst>
+                                            <p:cond delay="0"/>
+                                          </p:stCondLst>
+                                        </p:cTn>
+                                        <p:tgtEl>
+                                          <p:spTgt spid="3">
+                                            <p:txEl>
+                                              <p:pRg st="2" end="2"/>
+                                            </p:txEl>
+                                          </p:spTgt>
+                                        </p:tgtEl>
+                                        <p:attrNameLst>
+                                          <p:attrName>style.visibility</p:attrName>
+                                        </p:attrNameLst>
+                                      </p:cBhvr>
+                                      <p:to>
+                                        <p:strVal val="visible"/>
+                                      </p:to>
+                                    </p:set>
+                                    <p:animEffect transition="in" filter="fade">
+                                      <p:cBhvr>
+                                        <p:cTn id="17" dur="500"/>
+                                        <p:tgtEl>
+                                          <p:spTgt spid="3">
+                                            <p:txEl>
+                                              <p:pRg st="2" end="2"/>
+                                            </p:txEl>
+                                          </p:spTgt>
+                                        </p:tgtEl>
+                                      </p:cBhvr>
+                                    </p:animEffect>
+                                  </p:childTnLst>
+                                </p:cTn>
+                              </p:par>
+                            </p:childTnLst>
+                          </p:cTn>
+                        </p:par>
+                      </p:childTnLst>
+                    </p:cTn>
+                  </p:par>
+                  <p:par>
+                    <p:cTn id="18" fill="hold">
+                      <p:stCondLst>
+                        <p:cond delay="indefinite"/>
+                      </p:stCondLst>
+                      <p:childTnLst>
+                        <p:par>
+                          <p:cTn id="19" fill="hold">
+                            <p:stCondLst>
+                              <p:cond delay="0"/>
+                            </p:stCondLst>
+                            <p:childTnLst>
+                              <p:par>
+                                <p:cTn id="20" presetID="10" presetClass="entr" presetSubtype="0" fill="hold" nodeType="clickEffect">
+                                  <p:stCondLst>
+                                    <p:cond delay="0"/>
+                                  </p:stCondLst>
+                                  <p:childTnLst>
+                                    <p:set>
+                                      <p:cBhvr>
+                                        <p:cTn id="21" dur="1" fill="hold">
+                                          <p:stCondLst>
+                                            <p:cond delay="0"/>
+                                          </p:stCondLst>
+                                        </p:cTn>
+                                        <p:tgtEl>
+                                          <p:spTgt spid="3">
+                                            <p:txEl>
+                                              <p:pRg st="4" end="4"/>
+                                            </p:txEl>
+                                          </p:spTgt>
+                                        </p:tgtEl>
+                                        <p:attrNameLst>
+                                          <p:attrName>style.visibility</p:attrName>
+                                        </p:attrNameLst>
+                                      </p:cBhvr>
+                                      <p:to>
+                                        <p:strVal val="visible"/>
+                                      </p:to>
+                                    </p:set>
+                                    <p:animEffect transition="in" filter="fade">
+                                      <p:cBhvr>
+                                        <p:cTn id="22" dur="500"/>
+                                        <p:tgtEl>
+                                          <p:spTgt spid="3">
+                                            <p:txEl>
+                                              <p:pRg st="4" end="4"/>
+                                            </p:txEl>
+                                          </p:spTgt>
+                                        </p:tgtEl>
+                                      </p:cBhvr>
+                                    </p:animEffect>
+                                  </p:childTnLst>
+                                </p:cTn>
+                              </p:par>
+                            </p:childTnLst>
+                          </p:cTn>
+                        </p:par>
+                      </p:childTnLst>
+                    </p:cTn>
+                  </p:par>
+                </p:childTnLst>
+              </p:cTn>
+              <p:prevCondLst>
+                <p:cond evt="onPrev" delay="0">
+                  <p:tgtEl>
+                    <p:sldTgt/>
+                  </p:tgtEl>
+                </p:cond>
+              </p:prevCondLst>
+              <p:nextCondLst>
+                <p:cond evt="onNext" delay="0">
+                  <p:tgtEl>
+                    <p:sldTgt/>
+                  </p:tgtEl>
+                </p:cond>
+              </p:nextCondLst>
+            </p:seq>
+          </p:childTnLst>
+        </p:cTn>
+      </p:par>
+    </p:tnLst>
+  </p:timing>
 </p:sld>
 </file>
 
@@ -6222,7 +6496,7 @@
           <a:p>
             <a:r>
               <a:rPr lang="en-US" dirty="0"/>
-              <a:t>Prescribed synthetics have negative or no correlation to deaths</a:t>
+              <a:t>Prescribing synthetics has a negative to no correlation to deaths</a:t>
             </a:r>
           </a:p>
         </p:txBody>
@@ -6548,15 +6822,7 @@
           <a:p>
             <a:r>
               <a:rPr lang="en-US" dirty="0"/>
-              <a:t>The findings are limited to </a:t>
-            </a:r>
-            <a:r>
-              <a:rPr lang="en-US" dirty="0" err="1"/>
-              <a:t>medicare</a:t>
-            </a:r>
-            <a:r>
-              <a:rPr lang="en-US" dirty="0"/>
-              <a:t> users</a:t>
+              <a:t>The findings are limited to Medicare users</a:t>
             </a:r>
           </a:p>
         </p:txBody>
@@ -7018,7 +7284,7 @@
         </p:blipFill>
         <p:spPr>
           <a:xfrm>
-            <a:off x="2702196" y="3421688"/>
+            <a:off x="2500719" y="3421688"/>
             <a:ext cx="5349998" cy="3412930"/>
           </a:xfrm>
         </p:spPr>

</xml_diff>